<commit_message>
adding ppt and logo without background
</commit_message>
<xml_diff>
--- a/P_and_G_final_a.pptx
+++ b/P_and_G_final_a.pptx
@@ -4628,7 +4628,7 @@
         <p:spPr>
           <a:xfrm>
             <a:off x="82952" y="670752"/>
-            <a:ext cx="12041806" cy="584775"/>
+            <a:ext cx="12041806" cy="338554"/>
           </a:xfrm>
           <a:prstGeom prst="rect">
             <a:avLst/>
@@ -4649,23 +4649,16 @@
               <a:buChar char="•"/>
             </a:pPr>
             <a:r>
-              <a:rPr lang="en-US" sz="1600" dirty="0">
-                <a:latin typeface="Calibri"/>
-                <a:cs typeface="Calibri"/>
+              <a:rPr lang="en-US" sz="1600">
+                <a:hlinkClick r:id="rId3"/>
               </a:rPr>
-              <a:t>Using Open CV we created a Shelf health monitoring system to keep track of each row's health in real time.</a:t>
-            </a:r>
-          </a:p>
-          <a:p>
-            <a:pPr marL="285750" indent="-285750">
-              <a:buFont typeface="Arial"/>
-              <a:buChar char="•"/>
-            </a:pPr>
+              <a:t>https</a:t>
+            </a:r>
             <a:r>
               <a:rPr lang="en-US" sz="1600" dirty="0">
                 <a:hlinkClick r:id="rId3"/>
               </a:rPr>
-              <a:t>https://panasonic.net/cns/invc/osd/</a:t>
+              <a:t>://panasonic.net/cns/invc/osd/</a:t>
             </a:r>
             <a:endParaRPr lang="en-US" sz="1600" dirty="0">
               <a:latin typeface="Calibri"/>

</xml_diff>